<commit_message>
Added JNI bridge class. Updated pptx
</commit_message>
<xml_diff>
--- a/NDK.pptx
+++ b/NDK.pptx
@@ -10,10 +10,11 @@
     <p:sldId id="258" r:id="rId4"/>
     <p:sldId id="259" r:id="rId5"/>
     <p:sldId id="262" r:id="rId6"/>
-    <p:sldId id="263" r:id="rId7"/>
-    <p:sldId id="260" r:id="rId8"/>
-    <p:sldId id="261" r:id="rId9"/>
-    <p:sldId id="264" r:id="rId10"/>
+    <p:sldId id="265" r:id="rId7"/>
+    <p:sldId id="263" r:id="rId8"/>
+    <p:sldId id="260" r:id="rId9"/>
+    <p:sldId id="261" r:id="rId10"/>
+    <p:sldId id="264" r:id="rId11"/>
   </p:sldIdLst>
   <p:sldSz cx="12192000" cy="6858000"/>
   <p:notesSz cx="6858000" cy="9144000"/>
@@ -251,7 +252,7 @@
           <a:p>
             <a:fld id="{E68A8755-D758-4E0E-A7B6-8C6D23EC775F}" type="datetimeFigureOut">
               <a:rPr lang="en-US" smtClean="0"/>
-              <a:t>3/3/2018</a:t>
+              <a:t>3/4/2018</a:t>
             </a:fld>
             <a:endParaRPr lang="en-US"/>
           </a:p>
@@ -421,7 +422,7 @@
           <a:p>
             <a:fld id="{E68A8755-D758-4E0E-A7B6-8C6D23EC775F}" type="datetimeFigureOut">
               <a:rPr lang="en-US" smtClean="0"/>
-              <a:t>3/3/2018</a:t>
+              <a:t>3/4/2018</a:t>
             </a:fld>
             <a:endParaRPr lang="en-US"/>
           </a:p>
@@ -601,7 +602,7 @@
           <a:p>
             <a:fld id="{E68A8755-D758-4E0E-A7B6-8C6D23EC775F}" type="datetimeFigureOut">
               <a:rPr lang="en-US" smtClean="0"/>
-              <a:t>3/3/2018</a:t>
+              <a:t>3/4/2018</a:t>
             </a:fld>
             <a:endParaRPr lang="en-US"/>
           </a:p>
@@ -771,7 +772,7 @@
           <a:p>
             <a:fld id="{E68A8755-D758-4E0E-A7B6-8C6D23EC775F}" type="datetimeFigureOut">
               <a:rPr lang="en-US" smtClean="0"/>
-              <a:t>3/3/2018</a:t>
+              <a:t>3/4/2018</a:t>
             </a:fld>
             <a:endParaRPr lang="en-US"/>
           </a:p>
@@ -1017,7 +1018,7 @@
           <a:p>
             <a:fld id="{E68A8755-D758-4E0E-A7B6-8C6D23EC775F}" type="datetimeFigureOut">
               <a:rPr lang="en-US" smtClean="0"/>
-              <a:t>3/3/2018</a:t>
+              <a:t>3/4/2018</a:t>
             </a:fld>
             <a:endParaRPr lang="en-US"/>
           </a:p>
@@ -1249,7 +1250,7 @@
           <a:p>
             <a:fld id="{E68A8755-D758-4E0E-A7B6-8C6D23EC775F}" type="datetimeFigureOut">
               <a:rPr lang="en-US" smtClean="0"/>
-              <a:t>3/3/2018</a:t>
+              <a:t>3/4/2018</a:t>
             </a:fld>
             <a:endParaRPr lang="en-US"/>
           </a:p>
@@ -1616,7 +1617,7 @@
           <a:p>
             <a:fld id="{E68A8755-D758-4E0E-A7B6-8C6D23EC775F}" type="datetimeFigureOut">
               <a:rPr lang="en-US" smtClean="0"/>
-              <a:t>3/3/2018</a:t>
+              <a:t>3/4/2018</a:t>
             </a:fld>
             <a:endParaRPr lang="en-US"/>
           </a:p>
@@ -1734,7 +1735,7 @@
           <a:p>
             <a:fld id="{E68A8755-D758-4E0E-A7B6-8C6D23EC775F}" type="datetimeFigureOut">
               <a:rPr lang="en-US" smtClean="0"/>
-              <a:t>3/3/2018</a:t>
+              <a:t>3/4/2018</a:t>
             </a:fld>
             <a:endParaRPr lang="en-US"/>
           </a:p>
@@ -1829,7 +1830,7 @@
           <a:p>
             <a:fld id="{E68A8755-D758-4E0E-A7B6-8C6D23EC775F}" type="datetimeFigureOut">
               <a:rPr lang="en-US" smtClean="0"/>
-              <a:t>3/3/2018</a:t>
+              <a:t>3/4/2018</a:t>
             </a:fld>
             <a:endParaRPr lang="en-US"/>
           </a:p>
@@ -2106,7 +2107,7 @@
           <a:p>
             <a:fld id="{E68A8755-D758-4E0E-A7B6-8C6D23EC775F}" type="datetimeFigureOut">
               <a:rPr lang="en-US" smtClean="0"/>
-              <a:t>3/3/2018</a:t>
+              <a:t>3/4/2018</a:t>
             </a:fld>
             <a:endParaRPr lang="en-US"/>
           </a:p>
@@ -2359,7 +2360,7 @@
           <a:p>
             <a:fld id="{E68A8755-D758-4E0E-A7B6-8C6D23EC775F}" type="datetimeFigureOut">
               <a:rPr lang="en-US" smtClean="0"/>
-              <a:t>3/3/2018</a:t>
+              <a:t>3/4/2018</a:t>
             </a:fld>
             <a:endParaRPr lang="en-US"/>
           </a:p>
@@ -2603,7 +2604,7 @@
           <a:p>
             <a:fld id="{E68A8755-D758-4E0E-A7B6-8C6D23EC775F}" type="datetimeFigureOut">
               <a:rPr lang="en-US" smtClean="0"/>
-              <a:t>3/3/2018</a:t>
+              <a:t>3/4/2018</a:t>
             </a:fld>
             <a:endParaRPr lang="en-US"/>
           </a:p>
@@ -3025,7 +3026,15 @@
           <a:p>
             <a:r>
               <a:rPr lang="en-US" dirty="0"/>
-              <a:t>NDK: Crashes, errors and common mistakes</a:t>
+              <a:t>NDK: </a:t>
+            </a:r>
+            <a:r>
+              <a:rPr lang="en-US" dirty="0" smtClean="0"/>
+              <a:t>JNI crashes</a:t>
+            </a:r>
+            <a:r>
+              <a:rPr lang="en-US" dirty="0"/>
+              <a:t>, errors and common mistakes</a:t>
             </a:r>
           </a:p>
         </p:txBody>
@@ -3053,6 +3062,85 @@
     <p:extLst>
       <p:ext uri="{BB962C8B-B14F-4D97-AF65-F5344CB8AC3E}">
         <p14:creationId xmlns:p14="http://schemas.microsoft.com/office/powerpoint/2010/main" val="1829941670"/>
+      </p:ext>
+    </p:extLst>
+  </p:cSld>
+  <p:clrMapOvr>
+    <a:masterClrMapping/>
+  </p:clrMapOvr>
+  <p:timing>
+    <p:tnLst>
+      <p:par>
+        <p:cTn id="1" dur="indefinite" restart="never" nodeType="tmRoot"/>
+      </p:par>
+    </p:tnLst>
+  </p:timing>
+</p:sld>
+</file>
+
+<file path=ppt/slides/slide10.xml><?xml version="1.0" encoding="utf-8"?>
+<p:sld xmlns:a="http://schemas.openxmlformats.org/drawingml/2006/main" xmlns:r="http://schemas.openxmlformats.org/officeDocument/2006/relationships" xmlns:p="http://schemas.openxmlformats.org/presentationml/2006/main">
+  <p:cSld>
+    <p:spTree>
+      <p:nvGrpSpPr>
+        <p:cNvPr id="1" name=""/>
+        <p:cNvGrpSpPr/>
+        <p:nvPr/>
+      </p:nvGrpSpPr>
+      <p:grpSpPr>
+        <a:xfrm>
+          <a:off x="0" y="0"/>
+          <a:ext cx="0" cy="0"/>
+          <a:chOff x="0" y="0"/>
+          <a:chExt cx="0" cy="0"/>
+        </a:xfrm>
+      </p:grpSpPr>
+      <p:sp>
+        <p:nvSpPr>
+          <p:cNvPr id="2" name="Title 1"/>
+          <p:cNvSpPr>
+            <a:spLocks noGrp="1"/>
+          </p:cNvSpPr>
+          <p:nvPr>
+            <p:ph type="title"/>
+          </p:nvPr>
+        </p:nvSpPr>
+        <p:spPr/>
+        <p:txBody>
+          <a:bodyPr/>
+          <a:lstStyle/>
+          <a:p>
+            <a:r>
+              <a:rPr lang="en-US" dirty="0" smtClean="0"/>
+              <a:t>Thank you</a:t>
+            </a:r>
+            <a:endParaRPr lang="en-US" dirty="0"/>
+          </a:p>
+        </p:txBody>
+      </p:sp>
+      <p:sp>
+        <p:nvSpPr>
+          <p:cNvPr id="3" name="Content Placeholder 2"/>
+          <p:cNvSpPr>
+            <a:spLocks noGrp="1"/>
+          </p:cNvSpPr>
+          <p:nvPr>
+            <p:ph idx="1"/>
+          </p:nvPr>
+        </p:nvSpPr>
+        <p:spPr/>
+        <p:txBody>
+          <a:bodyPr/>
+          <a:lstStyle/>
+          <a:p>
+            <a:endParaRPr lang="en-US"/>
+          </a:p>
+        </p:txBody>
+      </p:sp>
+    </p:spTree>
+    <p:extLst>
+      <p:ext uri="{BB962C8B-B14F-4D97-AF65-F5344CB8AC3E}">
+        <p14:creationId xmlns:p14="http://schemas.microsoft.com/office/powerpoint/2010/main" val="1045684420"/>
       </p:ext>
     </p:extLst>
   </p:cSld>
@@ -3134,72 +3222,16 @@
           </a:p>
         </p:txBody>
       </p:sp>
-    </p:spTree>
-    <p:extLst>
-      <p:ext uri="{BB962C8B-B14F-4D97-AF65-F5344CB8AC3E}">
-        <p14:creationId xmlns:p14="http://schemas.microsoft.com/office/powerpoint/2010/main" val="3606916210"/>
-      </p:ext>
-    </p:extLst>
-  </p:cSld>
-  <p:clrMapOvr>
-    <a:masterClrMapping/>
-  </p:clrMapOvr>
-  <p:timing>
-    <p:tnLst>
-      <p:par>
-        <p:cTn id="1" dur="indefinite" restart="never" nodeType="tmRoot"/>
-      </p:par>
-    </p:tnLst>
-  </p:timing>
-</p:sld>
-</file>
-
-<file path=ppt/slides/slide3.xml><?xml version="1.0" encoding="utf-8"?>
-<p:sld xmlns:a="http://schemas.openxmlformats.org/drawingml/2006/main" xmlns:r="http://schemas.openxmlformats.org/officeDocument/2006/relationships" xmlns:p="http://schemas.openxmlformats.org/presentationml/2006/main">
-  <p:cSld>
-    <p:spTree>
-      <p:nvGrpSpPr>
-        <p:cNvPr id="1" name=""/>
-        <p:cNvGrpSpPr/>
-        <p:nvPr/>
-      </p:nvGrpSpPr>
-      <p:grpSpPr>
-        <a:xfrm>
-          <a:off x="0" y="0"/>
-          <a:ext cx="0" cy="0"/>
-          <a:chOff x="0" y="0"/>
-          <a:chExt cx="0" cy="0"/>
-        </a:xfrm>
-      </p:grpSpPr>
-      <p:sp>
-        <p:nvSpPr>
-          <p:cNvPr id="2" name="Title 1"/>
-          <p:cNvSpPr>
-            <a:spLocks noGrp="1"/>
-          </p:cNvSpPr>
-          <p:nvPr>
-            <p:ph type="title"/>
-          </p:nvPr>
-        </p:nvSpPr>
-        <p:spPr/>
-        <p:txBody>
-          <a:bodyPr/>
-          <a:lstStyle/>
-          <a:p>
-            <a:endParaRPr lang="en-US" dirty="0"/>
-          </a:p>
-        </p:txBody>
-      </p:sp>
       <p:graphicFrame>
         <p:nvGraphicFramePr>
-          <p:cNvPr id="5" name="Table 4"/>
+          <p:cNvPr id="4" name="Table 3"/>
           <p:cNvGraphicFramePr>
             <a:graphicFrameLocks noGrp="1"/>
           </p:cNvGraphicFramePr>
           <p:nvPr>
             <p:extLst>
               <p:ext uri="{D42A27DB-BD31-4B8C-83A1-F6EECF244321}">
-                <p14:modId xmlns:p14="http://schemas.microsoft.com/office/powerpoint/2010/main" val="2893228067"/>
+                <p14:modId xmlns:p14="http://schemas.microsoft.com/office/powerpoint/2010/main" val="3766292797"/>
               </p:ext>
             </p:extLst>
           </p:nvPr>
@@ -3550,7 +3582,7 @@
     </p:spTree>
     <p:extLst>
       <p:ext uri="{BB962C8B-B14F-4D97-AF65-F5344CB8AC3E}">
-        <p14:creationId xmlns:p14="http://schemas.microsoft.com/office/powerpoint/2010/main" val="3994290888"/>
+        <p14:creationId xmlns:p14="http://schemas.microsoft.com/office/powerpoint/2010/main" val="3606916210"/>
       </p:ext>
     </p:extLst>
   </p:cSld>
@@ -3563,6 +3595,1398 @@
         <p:cTn id="1" dur="indefinite" restart="never" nodeType="tmRoot"/>
       </p:par>
     </p:tnLst>
+  </p:timing>
+</p:sld>
+</file>
+
+<file path=ppt/slides/slide3.xml><?xml version="1.0" encoding="utf-8"?>
+<p:sld xmlns:a="http://schemas.openxmlformats.org/drawingml/2006/main" xmlns:r="http://schemas.openxmlformats.org/officeDocument/2006/relationships" xmlns:p="http://schemas.openxmlformats.org/presentationml/2006/main">
+  <p:cSld>
+    <p:spTree>
+      <p:nvGrpSpPr>
+        <p:cNvPr id="1" name=""/>
+        <p:cNvGrpSpPr/>
+        <p:nvPr/>
+      </p:nvGrpSpPr>
+      <p:grpSpPr>
+        <a:xfrm>
+          <a:off x="0" y="0"/>
+          <a:ext cx="0" cy="0"/>
+          <a:chOff x="0" y="0"/>
+          <a:chExt cx="0" cy="0"/>
+        </a:xfrm>
+      </p:grpSpPr>
+      <p:sp>
+        <p:nvSpPr>
+          <p:cNvPr id="2" name="Title 1"/>
+          <p:cNvSpPr>
+            <a:spLocks noGrp="1"/>
+          </p:cNvSpPr>
+          <p:nvPr>
+            <p:ph type="title"/>
+          </p:nvPr>
+        </p:nvSpPr>
+        <p:spPr/>
+        <p:txBody>
+          <a:bodyPr/>
+          <a:lstStyle/>
+          <a:p>
+            <a:pPr algn="ctr"/>
+            <a:r>
+              <a:rPr lang="en-US" dirty="0" smtClean="0"/>
+              <a:t>Why we use NDK/JNI?</a:t>
+            </a:r>
+            <a:endParaRPr lang="en-US" dirty="0"/>
+          </a:p>
+        </p:txBody>
+      </p:sp>
+      <p:sp>
+        <p:nvSpPr>
+          <p:cNvPr id="6" name="Rounded Rectangle 5"/>
+          <p:cNvSpPr/>
+          <p:nvPr/>
+        </p:nvSpPr>
+        <p:spPr>
+          <a:xfrm>
+            <a:off x="7165732" y="3215785"/>
+            <a:ext cx="1995853" cy="567104"/>
+          </a:xfrm>
+          <a:prstGeom prst="roundRect">
+            <a:avLst/>
+          </a:prstGeom>
+          <a:solidFill>
+            <a:schemeClr val="accent1">
+              <a:lumMod val="75000"/>
+            </a:schemeClr>
+          </a:solidFill>
+        </p:spPr>
+        <p:style>
+          <a:lnRef idx="2">
+            <a:schemeClr val="accent1">
+              <a:shade val="50000"/>
+            </a:schemeClr>
+          </a:lnRef>
+          <a:fillRef idx="1">
+            <a:schemeClr val="accent1"/>
+          </a:fillRef>
+          <a:effectRef idx="0">
+            <a:schemeClr val="accent1"/>
+          </a:effectRef>
+          <a:fontRef idx="minor">
+            <a:schemeClr val="lt1"/>
+          </a:fontRef>
+        </p:style>
+        <p:txBody>
+          <a:bodyPr rtlCol="0" anchor="ctr"/>
+          <a:lstStyle/>
+          <a:p>
+            <a:pPr algn="ctr"/>
+            <a:r>
+              <a:rPr lang="en-US" dirty="0" smtClean="0"/>
+              <a:t>C/C++ Core</a:t>
+            </a:r>
+            <a:endParaRPr lang="en-US" dirty="0"/>
+          </a:p>
+        </p:txBody>
+      </p:sp>
+      <p:sp>
+        <p:nvSpPr>
+          <p:cNvPr id="22" name="Rounded Rectangle 21"/>
+          <p:cNvSpPr/>
+          <p:nvPr/>
+        </p:nvSpPr>
+        <p:spPr>
+          <a:xfrm>
+            <a:off x="7165730" y="2497015"/>
+            <a:ext cx="1995855" cy="430823"/>
+          </a:xfrm>
+          <a:prstGeom prst="roundRect">
+            <a:avLst/>
+          </a:prstGeom>
+          <a:solidFill>
+            <a:srgbClr val="57B9AD"/>
+          </a:solidFill>
+        </p:spPr>
+        <p:style>
+          <a:lnRef idx="2">
+            <a:schemeClr val="accent1">
+              <a:shade val="50000"/>
+            </a:schemeClr>
+          </a:lnRef>
+          <a:fillRef idx="1">
+            <a:schemeClr val="accent1"/>
+          </a:fillRef>
+          <a:effectRef idx="0">
+            <a:schemeClr val="accent1"/>
+          </a:effectRef>
+          <a:fontRef idx="minor">
+            <a:schemeClr val="lt1"/>
+          </a:fontRef>
+        </p:style>
+        <p:txBody>
+          <a:bodyPr rtlCol="0" anchor="ctr"/>
+          <a:lstStyle/>
+          <a:p>
+            <a:pPr algn="ctr"/>
+            <a:r>
+              <a:rPr lang="en-US" dirty="0" smtClean="0"/>
+              <a:t>JNI Layer</a:t>
+            </a:r>
+            <a:endParaRPr lang="en-US" dirty="0"/>
+          </a:p>
+        </p:txBody>
+      </p:sp>
+      <p:sp>
+        <p:nvSpPr>
+          <p:cNvPr id="25" name="Rounded Rectangle 24"/>
+          <p:cNvSpPr/>
+          <p:nvPr/>
+        </p:nvSpPr>
+        <p:spPr>
+          <a:xfrm>
+            <a:off x="7165731" y="1668708"/>
+            <a:ext cx="1995854" cy="567103"/>
+          </a:xfrm>
+          <a:prstGeom prst="roundRect">
+            <a:avLst/>
+          </a:prstGeom>
+          <a:solidFill>
+            <a:schemeClr val="accent6">
+              <a:lumMod val="75000"/>
+            </a:schemeClr>
+          </a:solidFill>
+        </p:spPr>
+        <p:style>
+          <a:lnRef idx="2">
+            <a:schemeClr val="accent1">
+              <a:shade val="50000"/>
+            </a:schemeClr>
+          </a:lnRef>
+          <a:fillRef idx="1">
+            <a:schemeClr val="accent1"/>
+          </a:fillRef>
+          <a:effectRef idx="0">
+            <a:schemeClr val="accent1"/>
+          </a:effectRef>
+          <a:fontRef idx="minor">
+            <a:schemeClr val="lt1"/>
+          </a:fontRef>
+        </p:style>
+        <p:txBody>
+          <a:bodyPr rtlCol="0" anchor="ctr"/>
+          <a:lstStyle/>
+          <a:p>
+            <a:pPr algn="ctr"/>
+            <a:r>
+              <a:rPr lang="en-US" dirty="0" smtClean="0"/>
+              <a:t>Android Java Layer</a:t>
+            </a:r>
+            <a:endParaRPr lang="en-US" dirty="0"/>
+          </a:p>
+        </p:txBody>
+      </p:sp>
+      <p:sp>
+        <p:nvSpPr>
+          <p:cNvPr id="27" name="Rounded Rectangle 26"/>
+          <p:cNvSpPr/>
+          <p:nvPr/>
+        </p:nvSpPr>
+        <p:spPr>
+          <a:xfrm>
+            <a:off x="5946531" y="4249244"/>
+            <a:ext cx="1995854" cy="567103"/>
+          </a:xfrm>
+          <a:prstGeom prst="roundRect">
+            <a:avLst/>
+          </a:prstGeom>
+          <a:solidFill>
+            <a:schemeClr val="accent3"/>
+          </a:solidFill>
+        </p:spPr>
+        <p:style>
+          <a:lnRef idx="2">
+            <a:schemeClr val="accent1">
+              <a:shade val="50000"/>
+            </a:schemeClr>
+          </a:lnRef>
+          <a:fillRef idx="1">
+            <a:schemeClr val="accent1"/>
+          </a:fillRef>
+          <a:effectRef idx="0">
+            <a:schemeClr val="accent1"/>
+          </a:effectRef>
+          <a:fontRef idx="minor">
+            <a:schemeClr val="lt1"/>
+          </a:fontRef>
+        </p:style>
+        <p:txBody>
+          <a:bodyPr rtlCol="0" anchor="ctr"/>
+          <a:lstStyle/>
+          <a:p>
+            <a:pPr algn="ctr"/>
+            <a:r>
+              <a:rPr lang="en-US" dirty="0" smtClean="0"/>
+              <a:t>iOS Objective-C</a:t>
+            </a:r>
+            <a:endParaRPr lang="en-US" dirty="0"/>
+          </a:p>
+        </p:txBody>
+      </p:sp>
+      <p:sp>
+        <p:nvSpPr>
+          <p:cNvPr id="28" name="Rounded Rectangle 27"/>
+          <p:cNvSpPr/>
+          <p:nvPr/>
+        </p:nvSpPr>
+        <p:spPr>
+          <a:xfrm>
+            <a:off x="8604738" y="4249244"/>
+            <a:ext cx="2130669" cy="567103"/>
+          </a:xfrm>
+          <a:prstGeom prst="roundRect">
+            <a:avLst/>
+          </a:prstGeom>
+          <a:solidFill>
+            <a:schemeClr val="accent3"/>
+          </a:solidFill>
+        </p:spPr>
+        <p:style>
+          <a:lnRef idx="2">
+            <a:schemeClr val="accent1">
+              <a:shade val="50000"/>
+            </a:schemeClr>
+          </a:lnRef>
+          <a:fillRef idx="1">
+            <a:schemeClr val="accent1"/>
+          </a:fillRef>
+          <a:effectRef idx="0">
+            <a:schemeClr val="accent1"/>
+          </a:effectRef>
+          <a:fontRef idx="minor">
+            <a:schemeClr val="lt1"/>
+          </a:fontRef>
+        </p:style>
+        <p:txBody>
+          <a:bodyPr rtlCol="0" anchor="ctr"/>
+          <a:lstStyle/>
+          <a:p>
+            <a:pPr algn="ctr"/>
+            <a:r>
+              <a:rPr lang="en-US" dirty="0" err="1" smtClean="0"/>
+              <a:t>MacOS</a:t>
+            </a:r>
+            <a:r>
+              <a:rPr lang="en-US" dirty="0" smtClean="0"/>
+              <a:t> Objective-C</a:t>
+            </a:r>
+            <a:endParaRPr lang="en-US" dirty="0"/>
+          </a:p>
+        </p:txBody>
+      </p:sp>
+      <p:sp>
+        <p:nvSpPr>
+          <p:cNvPr id="29" name="Rounded Rectangle 28"/>
+          <p:cNvSpPr/>
+          <p:nvPr/>
+        </p:nvSpPr>
+        <p:spPr>
+          <a:xfrm>
+            <a:off x="9797562" y="3215785"/>
+            <a:ext cx="1995854" cy="567103"/>
+          </a:xfrm>
+          <a:prstGeom prst="roundRect">
+            <a:avLst/>
+          </a:prstGeom>
+          <a:solidFill>
+            <a:srgbClr val="7030A0"/>
+          </a:solidFill>
+        </p:spPr>
+        <p:style>
+          <a:lnRef idx="2">
+            <a:schemeClr val="accent1">
+              <a:shade val="50000"/>
+            </a:schemeClr>
+          </a:lnRef>
+          <a:fillRef idx="1">
+            <a:schemeClr val="accent1"/>
+          </a:fillRef>
+          <a:effectRef idx="0">
+            <a:schemeClr val="accent1"/>
+          </a:effectRef>
+          <a:fontRef idx="minor">
+            <a:schemeClr val="lt1"/>
+          </a:fontRef>
+        </p:style>
+        <p:txBody>
+          <a:bodyPr rtlCol="0" anchor="ctr"/>
+          <a:lstStyle/>
+          <a:p>
+            <a:pPr algn="ctr"/>
+            <a:r>
+              <a:rPr lang="en-US" dirty="0" smtClean="0"/>
+              <a:t>Win </a:t>
+            </a:r>
+            <a:r>
+              <a:rPr lang="en-US" dirty="0"/>
+              <a:t>desktop </a:t>
+            </a:r>
+            <a:r>
+              <a:rPr lang="en-US" dirty="0" smtClean="0"/>
+              <a:t>C++</a:t>
+            </a:r>
+            <a:endParaRPr lang="en-US" dirty="0"/>
+          </a:p>
+        </p:txBody>
+      </p:sp>
+      <p:sp>
+        <p:nvSpPr>
+          <p:cNvPr id="30" name="Content Placeholder 2"/>
+          <p:cNvSpPr>
+            <a:spLocks noGrp="1"/>
+          </p:cNvSpPr>
+          <p:nvPr>
+            <p:ph idx="1"/>
+          </p:nvPr>
+        </p:nvSpPr>
+        <p:spPr>
+          <a:xfrm>
+            <a:off x="838200" y="1668708"/>
+            <a:ext cx="5770684" cy="4508255"/>
+          </a:xfrm>
+        </p:spPr>
+        <p:txBody>
+          <a:bodyPr/>
+          <a:lstStyle/>
+          <a:p>
+            <a:r>
+              <a:rPr lang="en-US" dirty="0" smtClean="0"/>
+              <a:t>Legacy support</a:t>
+            </a:r>
+          </a:p>
+          <a:p>
+            <a:r>
+              <a:rPr lang="en-US" dirty="0" smtClean="0"/>
+              <a:t>Security, performance solutions</a:t>
+            </a:r>
+          </a:p>
+          <a:p>
+            <a:r>
+              <a:rPr lang="en-US" dirty="0" smtClean="0"/>
+              <a:t>Low-level platform specific API</a:t>
+            </a:r>
+            <a:endParaRPr lang="en-US" dirty="0" smtClean="0"/>
+          </a:p>
+          <a:p>
+            <a:r>
+              <a:rPr lang="en-US" dirty="0"/>
+              <a:t>C++ cross-platform solutions</a:t>
+            </a:r>
+          </a:p>
+          <a:p>
+            <a:endParaRPr lang="en-US" dirty="0" smtClean="0"/>
+          </a:p>
+          <a:p>
+            <a:pPr marL="0" indent="0">
+              <a:buNone/>
+            </a:pPr>
+            <a:endParaRPr lang="en-US" dirty="0" smtClean="0"/>
+          </a:p>
+        </p:txBody>
+      </p:sp>
+      <p:cxnSp>
+        <p:nvCxnSpPr>
+          <p:cNvPr id="40" name="Straight Arrow Connector 39"/>
+          <p:cNvCxnSpPr>
+            <a:stCxn id="6" idx="3"/>
+            <a:endCxn id="29" idx="1"/>
+          </p:cNvCxnSpPr>
+          <p:nvPr/>
+        </p:nvCxnSpPr>
+        <p:spPr>
+          <a:xfrm>
+            <a:off x="9161585" y="3499337"/>
+            <a:ext cx="635977" cy="0"/>
+          </a:xfrm>
+          <a:prstGeom prst="straightConnector1">
+            <a:avLst/>
+          </a:prstGeom>
+          <a:ln>
+            <a:headEnd type="triangle"/>
+            <a:tailEnd type="triangle"/>
+          </a:ln>
+        </p:spPr>
+        <p:style>
+          <a:lnRef idx="1">
+            <a:schemeClr val="accent1"/>
+          </a:lnRef>
+          <a:fillRef idx="0">
+            <a:schemeClr val="accent1"/>
+          </a:fillRef>
+          <a:effectRef idx="0">
+            <a:schemeClr val="accent1"/>
+          </a:effectRef>
+          <a:fontRef idx="minor">
+            <a:schemeClr val="tx1"/>
+          </a:fontRef>
+        </p:style>
+      </p:cxnSp>
+      <p:cxnSp>
+        <p:nvCxnSpPr>
+          <p:cNvPr id="45" name="Straight Arrow Connector 44"/>
+          <p:cNvCxnSpPr>
+            <a:stCxn id="6" idx="2"/>
+            <a:endCxn id="28" idx="0"/>
+          </p:cNvCxnSpPr>
+          <p:nvPr/>
+        </p:nvCxnSpPr>
+        <p:spPr>
+          <a:xfrm>
+            <a:off x="8163659" y="3782889"/>
+            <a:ext cx="1506414" cy="466355"/>
+          </a:xfrm>
+          <a:prstGeom prst="straightConnector1">
+            <a:avLst/>
+          </a:prstGeom>
+          <a:ln>
+            <a:headEnd type="triangle"/>
+            <a:tailEnd type="triangle"/>
+          </a:ln>
+        </p:spPr>
+        <p:style>
+          <a:lnRef idx="1">
+            <a:schemeClr val="accent1"/>
+          </a:lnRef>
+          <a:fillRef idx="0">
+            <a:schemeClr val="accent1"/>
+          </a:fillRef>
+          <a:effectRef idx="0">
+            <a:schemeClr val="accent1"/>
+          </a:effectRef>
+          <a:fontRef idx="minor">
+            <a:schemeClr val="tx1"/>
+          </a:fontRef>
+        </p:style>
+      </p:cxnSp>
+      <p:cxnSp>
+        <p:nvCxnSpPr>
+          <p:cNvPr id="48" name="Straight Arrow Connector 47"/>
+          <p:cNvCxnSpPr>
+            <a:stCxn id="6" idx="2"/>
+            <a:endCxn id="27" idx="0"/>
+          </p:cNvCxnSpPr>
+          <p:nvPr/>
+        </p:nvCxnSpPr>
+        <p:spPr>
+          <a:xfrm flipH="1">
+            <a:off x="6944458" y="3782889"/>
+            <a:ext cx="1219201" cy="466355"/>
+          </a:xfrm>
+          <a:prstGeom prst="straightConnector1">
+            <a:avLst/>
+          </a:prstGeom>
+          <a:ln>
+            <a:headEnd type="triangle"/>
+            <a:tailEnd type="triangle"/>
+          </a:ln>
+        </p:spPr>
+        <p:style>
+          <a:lnRef idx="1">
+            <a:schemeClr val="accent1"/>
+          </a:lnRef>
+          <a:fillRef idx="0">
+            <a:schemeClr val="accent1"/>
+          </a:fillRef>
+          <a:effectRef idx="0">
+            <a:schemeClr val="accent1"/>
+          </a:effectRef>
+          <a:fontRef idx="minor">
+            <a:schemeClr val="tx1"/>
+          </a:fontRef>
+        </p:style>
+      </p:cxnSp>
+      <p:cxnSp>
+        <p:nvCxnSpPr>
+          <p:cNvPr id="51" name="Straight Arrow Connector 50"/>
+          <p:cNvCxnSpPr>
+            <a:stCxn id="25" idx="2"/>
+            <a:endCxn id="22" idx="0"/>
+          </p:cNvCxnSpPr>
+          <p:nvPr/>
+        </p:nvCxnSpPr>
+        <p:spPr>
+          <a:xfrm>
+            <a:off x="8163658" y="2235811"/>
+            <a:ext cx="0" cy="261204"/>
+          </a:xfrm>
+          <a:prstGeom prst="straightConnector1">
+            <a:avLst/>
+          </a:prstGeom>
+          <a:ln>
+            <a:headEnd type="triangle"/>
+            <a:tailEnd type="triangle"/>
+          </a:ln>
+        </p:spPr>
+        <p:style>
+          <a:lnRef idx="1">
+            <a:schemeClr val="accent1"/>
+          </a:lnRef>
+          <a:fillRef idx="0">
+            <a:schemeClr val="accent1"/>
+          </a:fillRef>
+          <a:effectRef idx="0">
+            <a:schemeClr val="accent1"/>
+          </a:effectRef>
+          <a:fontRef idx="minor">
+            <a:schemeClr val="tx1"/>
+          </a:fontRef>
+        </p:style>
+      </p:cxnSp>
+      <p:cxnSp>
+        <p:nvCxnSpPr>
+          <p:cNvPr id="58" name="Straight Arrow Connector 57"/>
+          <p:cNvCxnSpPr/>
+          <p:nvPr/>
+        </p:nvCxnSpPr>
+        <p:spPr>
+          <a:xfrm>
+            <a:off x="8152462" y="2927838"/>
+            <a:ext cx="0" cy="261204"/>
+          </a:xfrm>
+          <a:prstGeom prst="straightConnector1">
+            <a:avLst/>
+          </a:prstGeom>
+          <a:ln>
+            <a:headEnd type="triangle"/>
+            <a:tailEnd type="triangle"/>
+          </a:ln>
+        </p:spPr>
+        <p:style>
+          <a:lnRef idx="1">
+            <a:schemeClr val="accent1"/>
+          </a:lnRef>
+          <a:fillRef idx="0">
+            <a:schemeClr val="accent1"/>
+          </a:fillRef>
+          <a:effectRef idx="0">
+            <a:schemeClr val="accent1"/>
+          </a:effectRef>
+          <a:fontRef idx="minor">
+            <a:schemeClr val="tx1"/>
+          </a:fontRef>
+        </p:style>
+      </p:cxnSp>
+    </p:spTree>
+    <p:extLst>
+      <p:ext uri="{BB962C8B-B14F-4D97-AF65-F5344CB8AC3E}">
+        <p14:creationId xmlns:p14="http://schemas.microsoft.com/office/powerpoint/2010/main" val="3994290888"/>
+      </p:ext>
+    </p:extLst>
+  </p:cSld>
+  <p:clrMapOvr>
+    <a:masterClrMapping/>
+  </p:clrMapOvr>
+  <p:timing>
+    <p:tnLst>
+      <p:par>
+        <p:cTn id="1" dur="indefinite" restart="never" nodeType="tmRoot">
+          <p:childTnLst>
+            <p:seq concurrent="1" nextAc="seek">
+              <p:cTn id="2" dur="indefinite" nodeType="mainSeq">
+                <p:childTnLst>
+                  <p:par>
+                    <p:cTn id="3" fill="hold">
+                      <p:stCondLst>
+                        <p:cond delay="indefinite"/>
+                      </p:stCondLst>
+                      <p:childTnLst>
+                        <p:par>
+                          <p:cTn id="4" fill="hold">
+                            <p:stCondLst>
+                              <p:cond delay="0"/>
+                            </p:stCondLst>
+                            <p:childTnLst>
+                              <p:par>
+                                <p:cTn id="5" presetID="1" presetClass="entr" presetSubtype="0" fill="hold" grpId="0" nodeType="clickEffect">
+                                  <p:stCondLst>
+                                    <p:cond delay="0"/>
+                                  </p:stCondLst>
+                                  <p:childTnLst>
+                                    <p:set>
+                                      <p:cBhvr>
+                                        <p:cTn id="6" dur="1" fill="hold">
+                                          <p:stCondLst>
+                                            <p:cond delay="0"/>
+                                          </p:stCondLst>
+                                        </p:cTn>
+                                        <p:tgtEl>
+                                          <p:spTgt spid="25"/>
+                                        </p:tgtEl>
+                                        <p:attrNameLst>
+                                          <p:attrName>style.visibility</p:attrName>
+                                        </p:attrNameLst>
+                                      </p:cBhvr>
+                                      <p:to>
+                                        <p:strVal val="visible"/>
+                                      </p:to>
+                                    </p:set>
+                                  </p:childTnLst>
+                                </p:cTn>
+                              </p:par>
+                            </p:childTnLst>
+                          </p:cTn>
+                        </p:par>
+                      </p:childTnLst>
+                    </p:cTn>
+                  </p:par>
+                  <p:par>
+                    <p:cTn id="7" fill="hold">
+                      <p:stCondLst>
+                        <p:cond delay="indefinite"/>
+                      </p:stCondLst>
+                      <p:childTnLst>
+                        <p:par>
+                          <p:cTn id="8" fill="hold">
+                            <p:stCondLst>
+                              <p:cond delay="0"/>
+                            </p:stCondLst>
+                            <p:childTnLst>
+                              <p:par>
+                                <p:cTn id="9" presetID="1" presetClass="entr" presetSubtype="0" fill="hold" grpId="0" nodeType="clickEffect">
+                                  <p:stCondLst>
+                                    <p:cond delay="0"/>
+                                  </p:stCondLst>
+                                  <p:childTnLst>
+                                    <p:set>
+                                      <p:cBhvr>
+                                        <p:cTn id="10" dur="1" fill="hold">
+                                          <p:stCondLst>
+                                            <p:cond delay="0"/>
+                                          </p:stCondLst>
+                                        </p:cTn>
+                                        <p:tgtEl>
+                                          <p:spTgt spid="27"/>
+                                        </p:tgtEl>
+                                        <p:attrNameLst>
+                                          <p:attrName>style.visibility</p:attrName>
+                                        </p:attrNameLst>
+                                      </p:cBhvr>
+                                      <p:to>
+                                        <p:strVal val="visible"/>
+                                      </p:to>
+                                    </p:set>
+                                  </p:childTnLst>
+                                </p:cTn>
+                              </p:par>
+                            </p:childTnLst>
+                          </p:cTn>
+                        </p:par>
+                      </p:childTnLst>
+                    </p:cTn>
+                  </p:par>
+                  <p:par>
+                    <p:cTn id="11" fill="hold">
+                      <p:stCondLst>
+                        <p:cond delay="indefinite"/>
+                      </p:stCondLst>
+                      <p:childTnLst>
+                        <p:par>
+                          <p:cTn id="12" fill="hold">
+                            <p:stCondLst>
+                              <p:cond delay="0"/>
+                            </p:stCondLst>
+                            <p:childTnLst>
+                              <p:par>
+                                <p:cTn id="13" presetID="1" presetClass="entr" presetSubtype="0" fill="hold" grpId="0" nodeType="clickEffect">
+                                  <p:stCondLst>
+                                    <p:cond delay="0"/>
+                                  </p:stCondLst>
+                                  <p:childTnLst>
+                                    <p:set>
+                                      <p:cBhvr>
+                                        <p:cTn id="14" dur="1" fill="hold">
+                                          <p:stCondLst>
+                                            <p:cond delay="0"/>
+                                          </p:stCondLst>
+                                        </p:cTn>
+                                        <p:tgtEl>
+                                          <p:spTgt spid="28"/>
+                                        </p:tgtEl>
+                                        <p:attrNameLst>
+                                          <p:attrName>style.visibility</p:attrName>
+                                        </p:attrNameLst>
+                                      </p:cBhvr>
+                                      <p:to>
+                                        <p:strVal val="visible"/>
+                                      </p:to>
+                                    </p:set>
+                                  </p:childTnLst>
+                                </p:cTn>
+                              </p:par>
+                            </p:childTnLst>
+                          </p:cTn>
+                        </p:par>
+                      </p:childTnLst>
+                    </p:cTn>
+                  </p:par>
+                  <p:par>
+                    <p:cTn id="15" fill="hold">
+                      <p:stCondLst>
+                        <p:cond delay="indefinite"/>
+                      </p:stCondLst>
+                      <p:childTnLst>
+                        <p:par>
+                          <p:cTn id="16" fill="hold">
+                            <p:stCondLst>
+                              <p:cond delay="0"/>
+                            </p:stCondLst>
+                            <p:childTnLst>
+                              <p:par>
+                                <p:cTn id="17" presetID="1" presetClass="entr" presetSubtype="0" fill="hold" grpId="0" nodeType="clickEffect">
+                                  <p:stCondLst>
+                                    <p:cond delay="0"/>
+                                  </p:stCondLst>
+                                  <p:childTnLst>
+                                    <p:set>
+                                      <p:cBhvr>
+                                        <p:cTn id="18" dur="1" fill="hold">
+                                          <p:stCondLst>
+                                            <p:cond delay="0"/>
+                                          </p:stCondLst>
+                                        </p:cTn>
+                                        <p:tgtEl>
+                                          <p:spTgt spid="29"/>
+                                        </p:tgtEl>
+                                        <p:attrNameLst>
+                                          <p:attrName>style.visibility</p:attrName>
+                                        </p:attrNameLst>
+                                      </p:cBhvr>
+                                      <p:to>
+                                        <p:strVal val="visible"/>
+                                      </p:to>
+                                    </p:set>
+                                  </p:childTnLst>
+                                </p:cTn>
+                              </p:par>
+                            </p:childTnLst>
+                          </p:cTn>
+                        </p:par>
+                      </p:childTnLst>
+                    </p:cTn>
+                  </p:par>
+                  <p:par>
+                    <p:cTn id="19" fill="hold">
+                      <p:stCondLst>
+                        <p:cond delay="indefinite"/>
+                      </p:stCondLst>
+                      <p:childTnLst>
+                        <p:par>
+                          <p:cTn id="20" fill="hold">
+                            <p:stCondLst>
+                              <p:cond delay="0"/>
+                            </p:stCondLst>
+                            <p:childTnLst>
+                              <p:par>
+                                <p:cTn id="21" presetID="1" presetClass="entr" presetSubtype="0" fill="hold" grpId="0" nodeType="clickEffect">
+                                  <p:stCondLst>
+                                    <p:cond delay="0"/>
+                                  </p:stCondLst>
+                                  <p:childTnLst>
+                                    <p:set>
+                                      <p:cBhvr>
+                                        <p:cTn id="22" dur="1" fill="hold">
+                                          <p:stCondLst>
+                                            <p:cond delay="0"/>
+                                          </p:stCondLst>
+                                        </p:cTn>
+                                        <p:tgtEl>
+                                          <p:spTgt spid="6"/>
+                                        </p:tgtEl>
+                                        <p:attrNameLst>
+                                          <p:attrName>style.visibility</p:attrName>
+                                        </p:attrNameLst>
+                                      </p:cBhvr>
+                                      <p:to>
+                                        <p:strVal val="visible"/>
+                                      </p:to>
+                                    </p:set>
+                                  </p:childTnLst>
+                                </p:cTn>
+                              </p:par>
+                            </p:childTnLst>
+                          </p:cTn>
+                        </p:par>
+                      </p:childTnLst>
+                    </p:cTn>
+                  </p:par>
+                  <p:par>
+                    <p:cTn id="23" fill="hold">
+                      <p:stCondLst>
+                        <p:cond delay="indefinite"/>
+                      </p:stCondLst>
+                      <p:childTnLst>
+                        <p:par>
+                          <p:cTn id="24" fill="hold">
+                            <p:stCondLst>
+                              <p:cond delay="0"/>
+                            </p:stCondLst>
+                            <p:childTnLst>
+                              <p:par>
+                                <p:cTn id="25" presetID="53" presetClass="entr" presetSubtype="16" fill="hold" nodeType="clickEffect">
+                                  <p:stCondLst>
+                                    <p:cond delay="0"/>
+                                  </p:stCondLst>
+                                  <p:childTnLst>
+                                    <p:set>
+                                      <p:cBhvr>
+                                        <p:cTn id="26" dur="1" fill="hold">
+                                          <p:stCondLst>
+                                            <p:cond delay="0"/>
+                                          </p:stCondLst>
+                                        </p:cTn>
+                                        <p:tgtEl>
+                                          <p:spTgt spid="48"/>
+                                        </p:tgtEl>
+                                        <p:attrNameLst>
+                                          <p:attrName>style.visibility</p:attrName>
+                                        </p:attrNameLst>
+                                      </p:cBhvr>
+                                      <p:to>
+                                        <p:strVal val="visible"/>
+                                      </p:to>
+                                    </p:set>
+                                    <p:anim calcmode="lin" valueType="num">
+                                      <p:cBhvr>
+                                        <p:cTn id="27" dur="500" fill="hold"/>
+                                        <p:tgtEl>
+                                          <p:spTgt spid="48"/>
+                                        </p:tgtEl>
+                                        <p:attrNameLst>
+                                          <p:attrName>ppt_w</p:attrName>
+                                        </p:attrNameLst>
+                                      </p:cBhvr>
+                                      <p:tavLst>
+                                        <p:tav tm="0">
+                                          <p:val>
+                                            <p:fltVal val="0"/>
+                                          </p:val>
+                                        </p:tav>
+                                        <p:tav tm="100000">
+                                          <p:val>
+                                            <p:strVal val="#ppt_w"/>
+                                          </p:val>
+                                        </p:tav>
+                                      </p:tavLst>
+                                    </p:anim>
+                                    <p:anim calcmode="lin" valueType="num">
+                                      <p:cBhvr>
+                                        <p:cTn id="28" dur="500" fill="hold"/>
+                                        <p:tgtEl>
+                                          <p:spTgt spid="48"/>
+                                        </p:tgtEl>
+                                        <p:attrNameLst>
+                                          <p:attrName>ppt_h</p:attrName>
+                                        </p:attrNameLst>
+                                      </p:cBhvr>
+                                      <p:tavLst>
+                                        <p:tav tm="0">
+                                          <p:val>
+                                            <p:fltVal val="0"/>
+                                          </p:val>
+                                        </p:tav>
+                                        <p:tav tm="100000">
+                                          <p:val>
+                                            <p:strVal val="#ppt_h"/>
+                                          </p:val>
+                                        </p:tav>
+                                      </p:tavLst>
+                                    </p:anim>
+                                    <p:animEffect transition="in" filter="fade">
+                                      <p:cBhvr>
+                                        <p:cTn id="29" dur="500"/>
+                                        <p:tgtEl>
+                                          <p:spTgt spid="48"/>
+                                        </p:tgtEl>
+                                      </p:cBhvr>
+                                    </p:animEffect>
+                                  </p:childTnLst>
+                                </p:cTn>
+                              </p:par>
+                            </p:childTnLst>
+                          </p:cTn>
+                        </p:par>
+                      </p:childTnLst>
+                    </p:cTn>
+                  </p:par>
+                  <p:par>
+                    <p:cTn id="30" fill="hold">
+                      <p:stCondLst>
+                        <p:cond delay="indefinite"/>
+                      </p:stCondLst>
+                      <p:childTnLst>
+                        <p:par>
+                          <p:cTn id="31" fill="hold">
+                            <p:stCondLst>
+                              <p:cond delay="0"/>
+                            </p:stCondLst>
+                            <p:childTnLst>
+                              <p:par>
+                                <p:cTn id="32" presetID="53" presetClass="entr" presetSubtype="16" fill="hold" nodeType="clickEffect">
+                                  <p:stCondLst>
+                                    <p:cond delay="0"/>
+                                  </p:stCondLst>
+                                  <p:childTnLst>
+                                    <p:set>
+                                      <p:cBhvr>
+                                        <p:cTn id="33" dur="1" fill="hold">
+                                          <p:stCondLst>
+                                            <p:cond delay="0"/>
+                                          </p:stCondLst>
+                                        </p:cTn>
+                                        <p:tgtEl>
+                                          <p:spTgt spid="45"/>
+                                        </p:tgtEl>
+                                        <p:attrNameLst>
+                                          <p:attrName>style.visibility</p:attrName>
+                                        </p:attrNameLst>
+                                      </p:cBhvr>
+                                      <p:to>
+                                        <p:strVal val="visible"/>
+                                      </p:to>
+                                    </p:set>
+                                    <p:anim calcmode="lin" valueType="num">
+                                      <p:cBhvr>
+                                        <p:cTn id="34" dur="500" fill="hold"/>
+                                        <p:tgtEl>
+                                          <p:spTgt spid="45"/>
+                                        </p:tgtEl>
+                                        <p:attrNameLst>
+                                          <p:attrName>ppt_w</p:attrName>
+                                        </p:attrNameLst>
+                                      </p:cBhvr>
+                                      <p:tavLst>
+                                        <p:tav tm="0">
+                                          <p:val>
+                                            <p:fltVal val="0"/>
+                                          </p:val>
+                                        </p:tav>
+                                        <p:tav tm="100000">
+                                          <p:val>
+                                            <p:strVal val="#ppt_w"/>
+                                          </p:val>
+                                        </p:tav>
+                                      </p:tavLst>
+                                    </p:anim>
+                                    <p:anim calcmode="lin" valueType="num">
+                                      <p:cBhvr>
+                                        <p:cTn id="35" dur="500" fill="hold"/>
+                                        <p:tgtEl>
+                                          <p:spTgt spid="45"/>
+                                        </p:tgtEl>
+                                        <p:attrNameLst>
+                                          <p:attrName>ppt_h</p:attrName>
+                                        </p:attrNameLst>
+                                      </p:cBhvr>
+                                      <p:tavLst>
+                                        <p:tav tm="0">
+                                          <p:val>
+                                            <p:fltVal val="0"/>
+                                          </p:val>
+                                        </p:tav>
+                                        <p:tav tm="100000">
+                                          <p:val>
+                                            <p:strVal val="#ppt_h"/>
+                                          </p:val>
+                                        </p:tav>
+                                      </p:tavLst>
+                                    </p:anim>
+                                    <p:animEffect transition="in" filter="fade">
+                                      <p:cBhvr>
+                                        <p:cTn id="36" dur="500"/>
+                                        <p:tgtEl>
+                                          <p:spTgt spid="45"/>
+                                        </p:tgtEl>
+                                      </p:cBhvr>
+                                    </p:animEffect>
+                                  </p:childTnLst>
+                                </p:cTn>
+                              </p:par>
+                            </p:childTnLst>
+                          </p:cTn>
+                        </p:par>
+                      </p:childTnLst>
+                    </p:cTn>
+                  </p:par>
+                  <p:par>
+                    <p:cTn id="37" fill="hold">
+                      <p:stCondLst>
+                        <p:cond delay="indefinite"/>
+                      </p:stCondLst>
+                      <p:childTnLst>
+                        <p:par>
+                          <p:cTn id="38" fill="hold">
+                            <p:stCondLst>
+                              <p:cond delay="0"/>
+                            </p:stCondLst>
+                            <p:childTnLst>
+                              <p:par>
+                                <p:cTn id="39" presetID="53" presetClass="entr" presetSubtype="16" fill="hold" nodeType="clickEffect">
+                                  <p:stCondLst>
+                                    <p:cond delay="0"/>
+                                  </p:stCondLst>
+                                  <p:childTnLst>
+                                    <p:set>
+                                      <p:cBhvr>
+                                        <p:cTn id="40" dur="1" fill="hold">
+                                          <p:stCondLst>
+                                            <p:cond delay="0"/>
+                                          </p:stCondLst>
+                                        </p:cTn>
+                                        <p:tgtEl>
+                                          <p:spTgt spid="40"/>
+                                        </p:tgtEl>
+                                        <p:attrNameLst>
+                                          <p:attrName>style.visibility</p:attrName>
+                                        </p:attrNameLst>
+                                      </p:cBhvr>
+                                      <p:to>
+                                        <p:strVal val="visible"/>
+                                      </p:to>
+                                    </p:set>
+                                    <p:anim calcmode="lin" valueType="num">
+                                      <p:cBhvr>
+                                        <p:cTn id="41" dur="500" fill="hold"/>
+                                        <p:tgtEl>
+                                          <p:spTgt spid="40"/>
+                                        </p:tgtEl>
+                                        <p:attrNameLst>
+                                          <p:attrName>ppt_w</p:attrName>
+                                        </p:attrNameLst>
+                                      </p:cBhvr>
+                                      <p:tavLst>
+                                        <p:tav tm="0">
+                                          <p:val>
+                                            <p:fltVal val="0"/>
+                                          </p:val>
+                                        </p:tav>
+                                        <p:tav tm="100000">
+                                          <p:val>
+                                            <p:strVal val="#ppt_w"/>
+                                          </p:val>
+                                        </p:tav>
+                                      </p:tavLst>
+                                    </p:anim>
+                                    <p:anim calcmode="lin" valueType="num">
+                                      <p:cBhvr>
+                                        <p:cTn id="42" dur="500" fill="hold"/>
+                                        <p:tgtEl>
+                                          <p:spTgt spid="40"/>
+                                        </p:tgtEl>
+                                        <p:attrNameLst>
+                                          <p:attrName>ppt_h</p:attrName>
+                                        </p:attrNameLst>
+                                      </p:cBhvr>
+                                      <p:tavLst>
+                                        <p:tav tm="0">
+                                          <p:val>
+                                            <p:fltVal val="0"/>
+                                          </p:val>
+                                        </p:tav>
+                                        <p:tav tm="100000">
+                                          <p:val>
+                                            <p:strVal val="#ppt_h"/>
+                                          </p:val>
+                                        </p:tav>
+                                      </p:tavLst>
+                                    </p:anim>
+                                    <p:animEffect transition="in" filter="fade">
+                                      <p:cBhvr>
+                                        <p:cTn id="43" dur="500"/>
+                                        <p:tgtEl>
+                                          <p:spTgt spid="40"/>
+                                        </p:tgtEl>
+                                      </p:cBhvr>
+                                    </p:animEffect>
+                                  </p:childTnLst>
+                                </p:cTn>
+                              </p:par>
+                            </p:childTnLst>
+                          </p:cTn>
+                        </p:par>
+                      </p:childTnLst>
+                    </p:cTn>
+                  </p:par>
+                  <p:par>
+                    <p:cTn id="44" fill="hold">
+                      <p:stCondLst>
+                        <p:cond delay="indefinite"/>
+                      </p:stCondLst>
+                      <p:childTnLst>
+                        <p:par>
+                          <p:cTn id="45" fill="hold">
+                            <p:stCondLst>
+                              <p:cond delay="0"/>
+                            </p:stCondLst>
+                            <p:childTnLst>
+                              <p:par>
+                                <p:cTn id="46" presetID="1" presetClass="entr" presetSubtype="0" fill="hold" grpId="0" nodeType="clickEffect">
+                                  <p:stCondLst>
+                                    <p:cond delay="0"/>
+                                  </p:stCondLst>
+                                  <p:childTnLst>
+                                    <p:set>
+                                      <p:cBhvr>
+                                        <p:cTn id="47" dur="1" fill="hold">
+                                          <p:stCondLst>
+                                            <p:cond delay="0"/>
+                                          </p:stCondLst>
+                                        </p:cTn>
+                                        <p:tgtEl>
+                                          <p:spTgt spid="22"/>
+                                        </p:tgtEl>
+                                        <p:attrNameLst>
+                                          <p:attrName>style.visibility</p:attrName>
+                                        </p:attrNameLst>
+                                      </p:cBhvr>
+                                      <p:to>
+                                        <p:strVal val="visible"/>
+                                      </p:to>
+                                    </p:set>
+                                  </p:childTnLst>
+                                </p:cTn>
+                              </p:par>
+                            </p:childTnLst>
+                          </p:cTn>
+                        </p:par>
+                      </p:childTnLst>
+                    </p:cTn>
+                  </p:par>
+                  <p:par>
+                    <p:cTn id="48" fill="hold">
+                      <p:stCondLst>
+                        <p:cond delay="indefinite"/>
+                      </p:stCondLst>
+                      <p:childTnLst>
+                        <p:par>
+                          <p:cTn id="49" fill="hold">
+                            <p:stCondLst>
+                              <p:cond delay="0"/>
+                            </p:stCondLst>
+                            <p:childTnLst>
+                              <p:par>
+                                <p:cTn id="50" presetID="53" presetClass="entr" presetSubtype="16" fill="hold" nodeType="clickEffect">
+                                  <p:stCondLst>
+                                    <p:cond delay="0"/>
+                                  </p:stCondLst>
+                                  <p:childTnLst>
+                                    <p:set>
+                                      <p:cBhvr>
+                                        <p:cTn id="51" dur="1" fill="hold">
+                                          <p:stCondLst>
+                                            <p:cond delay="0"/>
+                                          </p:stCondLst>
+                                        </p:cTn>
+                                        <p:tgtEl>
+                                          <p:spTgt spid="51"/>
+                                        </p:tgtEl>
+                                        <p:attrNameLst>
+                                          <p:attrName>style.visibility</p:attrName>
+                                        </p:attrNameLst>
+                                      </p:cBhvr>
+                                      <p:to>
+                                        <p:strVal val="visible"/>
+                                      </p:to>
+                                    </p:set>
+                                    <p:anim calcmode="lin" valueType="num">
+                                      <p:cBhvr>
+                                        <p:cTn id="52" dur="500" fill="hold"/>
+                                        <p:tgtEl>
+                                          <p:spTgt spid="51"/>
+                                        </p:tgtEl>
+                                        <p:attrNameLst>
+                                          <p:attrName>ppt_w</p:attrName>
+                                        </p:attrNameLst>
+                                      </p:cBhvr>
+                                      <p:tavLst>
+                                        <p:tav tm="0">
+                                          <p:val>
+                                            <p:fltVal val="0"/>
+                                          </p:val>
+                                        </p:tav>
+                                        <p:tav tm="100000">
+                                          <p:val>
+                                            <p:strVal val="#ppt_w"/>
+                                          </p:val>
+                                        </p:tav>
+                                      </p:tavLst>
+                                    </p:anim>
+                                    <p:anim calcmode="lin" valueType="num">
+                                      <p:cBhvr>
+                                        <p:cTn id="53" dur="500" fill="hold"/>
+                                        <p:tgtEl>
+                                          <p:spTgt spid="51"/>
+                                        </p:tgtEl>
+                                        <p:attrNameLst>
+                                          <p:attrName>ppt_h</p:attrName>
+                                        </p:attrNameLst>
+                                      </p:cBhvr>
+                                      <p:tavLst>
+                                        <p:tav tm="0">
+                                          <p:val>
+                                            <p:fltVal val="0"/>
+                                          </p:val>
+                                        </p:tav>
+                                        <p:tav tm="100000">
+                                          <p:val>
+                                            <p:strVal val="#ppt_h"/>
+                                          </p:val>
+                                        </p:tav>
+                                      </p:tavLst>
+                                    </p:anim>
+                                    <p:animEffect transition="in" filter="fade">
+                                      <p:cBhvr>
+                                        <p:cTn id="54" dur="500"/>
+                                        <p:tgtEl>
+                                          <p:spTgt spid="51"/>
+                                        </p:tgtEl>
+                                      </p:cBhvr>
+                                    </p:animEffect>
+                                  </p:childTnLst>
+                                </p:cTn>
+                              </p:par>
+                            </p:childTnLst>
+                          </p:cTn>
+                        </p:par>
+                      </p:childTnLst>
+                    </p:cTn>
+                  </p:par>
+                  <p:par>
+                    <p:cTn id="55" fill="hold">
+                      <p:stCondLst>
+                        <p:cond delay="indefinite"/>
+                      </p:stCondLst>
+                      <p:childTnLst>
+                        <p:par>
+                          <p:cTn id="56" fill="hold">
+                            <p:stCondLst>
+                              <p:cond delay="0"/>
+                            </p:stCondLst>
+                            <p:childTnLst>
+                              <p:par>
+                                <p:cTn id="57" presetID="53" presetClass="entr" presetSubtype="16" fill="hold" nodeType="clickEffect">
+                                  <p:stCondLst>
+                                    <p:cond delay="0"/>
+                                  </p:stCondLst>
+                                  <p:childTnLst>
+                                    <p:set>
+                                      <p:cBhvr>
+                                        <p:cTn id="58" dur="1" fill="hold">
+                                          <p:stCondLst>
+                                            <p:cond delay="0"/>
+                                          </p:stCondLst>
+                                        </p:cTn>
+                                        <p:tgtEl>
+                                          <p:spTgt spid="58"/>
+                                        </p:tgtEl>
+                                        <p:attrNameLst>
+                                          <p:attrName>style.visibility</p:attrName>
+                                        </p:attrNameLst>
+                                      </p:cBhvr>
+                                      <p:to>
+                                        <p:strVal val="visible"/>
+                                      </p:to>
+                                    </p:set>
+                                    <p:anim calcmode="lin" valueType="num">
+                                      <p:cBhvr>
+                                        <p:cTn id="59" dur="500" fill="hold"/>
+                                        <p:tgtEl>
+                                          <p:spTgt spid="58"/>
+                                        </p:tgtEl>
+                                        <p:attrNameLst>
+                                          <p:attrName>ppt_w</p:attrName>
+                                        </p:attrNameLst>
+                                      </p:cBhvr>
+                                      <p:tavLst>
+                                        <p:tav tm="0">
+                                          <p:val>
+                                            <p:fltVal val="0"/>
+                                          </p:val>
+                                        </p:tav>
+                                        <p:tav tm="100000">
+                                          <p:val>
+                                            <p:strVal val="#ppt_w"/>
+                                          </p:val>
+                                        </p:tav>
+                                      </p:tavLst>
+                                    </p:anim>
+                                    <p:anim calcmode="lin" valueType="num">
+                                      <p:cBhvr>
+                                        <p:cTn id="60" dur="500" fill="hold"/>
+                                        <p:tgtEl>
+                                          <p:spTgt spid="58"/>
+                                        </p:tgtEl>
+                                        <p:attrNameLst>
+                                          <p:attrName>ppt_h</p:attrName>
+                                        </p:attrNameLst>
+                                      </p:cBhvr>
+                                      <p:tavLst>
+                                        <p:tav tm="0">
+                                          <p:val>
+                                            <p:fltVal val="0"/>
+                                          </p:val>
+                                        </p:tav>
+                                        <p:tav tm="100000">
+                                          <p:val>
+                                            <p:strVal val="#ppt_h"/>
+                                          </p:val>
+                                        </p:tav>
+                                      </p:tavLst>
+                                    </p:anim>
+                                    <p:animEffect transition="in" filter="fade">
+                                      <p:cBhvr>
+                                        <p:cTn id="61" dur="500"/>
+                                        <p:tgtEl>
+                                          <p:spTgt spid="58"/>
+                                        </p:tgtEl>
+                                      </p:cBhvr>
+                                    </p:animEffect>
+                                  </p:childTnLst>
+                                </p:cTn>
+                              </p:par>
+                            </p:childTnLst>
+                          </p:cTn>
+                        </p:par>
+                      </p:childTnLst>
+                    </p:cTn>
+                  </p:par>
+                </p:childTnLst>
+              </p:cTn>
+              <p:prevCondLst>
+                <p:cond evt="onPrev" delay="0">
+                  <p:tgtEl>
+                    <p:sldTgt/>
+                  </p:tgtEl>
+                </p:cond>
+              </p:prevCondLst>
+              <p:nextCondLst>
+                <p:cond evt="onNext" delay="0">
+                  <p:tgtEl>
+                    <p:sldTgt/>
+                  </p:tgtEl>
+                </p:cond>
+              </p:nextCondLst>
+            </p:seq>
+          </p:childTnLst>
+        </p:cTn>
+      </p:par>
+    </p:tnLst>
+    <p:bldLst>
+      <p:bldP spid="6" grpId="0" animBg="1"/>
+      <p:bldP spid="22" grpId="0" animBg="1"/>
+      <p:bldP spid="25" grpId="0" animBg="1"/>
+      <p:bldP spid="27" grpId="0" animBg="1"/>
+      <p:bldP spid="28" grpId="0" animBg="1"/>
+      <p:bldP spid="29" grpId="0" animBg="1"/>
+    </p:bldLst>
   </p:timing>
 </p:sld>
 </file>
@@ -3599,6 +5023,7 @@
           <a:bodyPr/>
           <a:lstStyle/>
           <a:p>
+            <a:pPr algn="ctr"/>
             <a:r>
               <a:rPr lang="en-US" dirty="0" smtClean="0"/>
               <a:t>Local and Global References</a:t>
@@ -3999,6 +5424,7 @@
           <a:bodyPr/>
           <a:lstStyle/>
           <a:p>
+            <a:pPr algn="ctr"/>
             <a:r>
               <a:rPr lang="en-US" dirty="0" smtClean="0"/>
               <a:t>Native threads</a:t>
@@ -4022,6 +5448,10 @@
           <a:bodyPr/>
           <a:lstStyle/>
           <a:p>
+            <a:r>
+              <a:rPr lang="en-US" dirty="0" smtClean="0"/>
+              <a:t>Do not forget to attach native thread to the JVM</a:t>
+            </a:r>
             <a:endParaRPr lang="en-US" dirty="0"/>
           </a:p>
         </p:txBody>
@@ -4078,9 +5508,10 @@
           <a:bodyPr/>
           <a:lstStyle/>
           <a:p>
+            <a:pPr algn="ctr"/>
             <a:r>
               <a:rPr lang="en-US" dirty="0" smtClean="0"/>
-              <a:t>Exception handling</a:t>
+              <a:t>Linker problems</a:t>
             </a:r>
             <a:endParaRPr lang="en-US" dirty="0"/>
           </a:p>
@@ -4101,6 +5532,22 @@
           <a:bodyPr/>
           <a:lstStyle/>
           <a:p>
+            <a:r>
+              <a:rPr lang="en-US" dirty="0" smtClean="0"/>
+              <a:t>Java obfuscation</a:t>
+            </a:r>
+          </a:p>
+          <a:p>
+            <a:r>
+              <a:rPr lang="en-US" dirty="0" smtClean="0"/>
+              <a:t>Java </a:t>
+            </a:r>
+          </a:p>
+          <a:p>
+            <a:r>
+              <a:rPr lang="en-US" dirty="0" smtClean="0"/>
+              <a:t>C++</a:t>
+            </a:r>
             <a:endParaRPr lang="en-US" dirty="0"/>
           </a:p>
         </p:txBody>
@@ -4108,7 +5555,7 @@
     </p:spTree>
     <p:extLst>
       <p:ext uri="{BB962C8B-B14F-4D97-AF65-F5344CB8AC3E}">
-        <p14:creationId xmlns:p14="http://schemas.microsoft.com/office/powerpoint/2010/main" val="670405104"/>
+        <p14:creationId xmlns:p14="http://schemas.microsoft.com/office/powerpoint/2010/main" val="361249591"/>
       </p:ext>
     </p:extLst>
   </p:cSld>
@@ -4159,7 +5606,7 @@
           <a:p>
             <a:r>
               <a:rPr lang="en-US" dirty="0" smtClean="0"/>
-              <a:t>Reduce APK size by reducing C/C++ artefacts</a:t>
+              <a:t>Exception handling</a:t>
             </a:r>
             <a:endParaRPr lang="en-US" dirty="0"/>
           </a:p>
@@ -4179,6 +5626,12 @@
         <p:txBody>
           <a:bodyPr/>
           <a:lstStyle/>
+          <a:p>
+            <a:r>
+              <a:rPr lang="en-US" dirty="0" smtClean="0"/>
+              <a:t>How to enable C++ exception support</a:t>
+            </a:r>
+          </a:p>
           <a:p>
             <a:endParaRPr lang="en-US" dirty="0"/>
           </a:p>
@@ -4187,7 +5640,7 @@
     </p:spTree>
     <p:extLst>
       <p:ext uri="{BB962C8B-B14F-4D97-AF65-F5344CB8AC3E}">
-        <p14:creationId xmlns:p14="http://schemas.microsoft.com/office/powerpoint/2010/main" val="3291943501"/>
+        <p14:creationId xmlns:p14="http://schemas.microsoft.com/office/powerpoint/2010/main" val="670405104"/>
       </p:ext>
     </p:extLst>
   </p:cSld>
@@ -4238,7 +5691,7 @@
           <a:p>
             <a:r>
               <a:rPr lang="en-US" dirty="0" smtClean="0"/>
-              <a:t>Crash handling</a:t>
+              <a:t>Reduce APK size by reducing C/C++ artefacts</a:t>
             </a:r>
             <a:endParaRPr lang="en-US" dirty="0"/>
           </a:p>
@@ -4266,7 +5719,7 @@
     </p:spTree>
     <p:extLst>
       <p:ext uri="{BB962C8B-B14F-4D97-AF65-F5344CB8AC3E}">
-        <p14:creationId xmlns:p14="http://schemas.microsoft.com/office/powerpoint/2010/main" val="2286164954"/>
+        <p14:creationId xmlns:p14="http://schemas.microsoft.com/office/powerpoint/2010/main" val="3291943501"/>
       </p:ext>
     </p:extLst>
   </p:cSld>
@@ -4317,7 +5770,7 @@
           <a:p>
             <a:r>
               <a:rPr lang="en-US" dirty="0" smtClean="0"/>
-              <a:t>Thank you</a:t>
+              <a:t>Crash handling</a:t>
             </a:r>
             <a:endParaRPr lang="en-US" dirty="0"/>
           </a:p>
@@ -4338,14 +5791,14 @@
           <a:bodyPr/>
           <a:lstStyle/>
           <a:p>
-            <a:endParaRPr lang="en-US"/>
+            <a:endParaRPr lang="en-US" dirty="0"/>
           </a:p>
         </p:txBody>
       </p:sp>
     </p:spTree>
     <p:extLst>
       <p:ext uri="{BB962C8B-B14F-4D97-AF65-F5344CB8AC3E}">
-        <p14:creationId xmlns:p14="http://schemas.microsoft.com/office/powerpoint/2010/main" val="1045684420"/>
+        <p14:creationId xmlns:p14="http://schemas.microsoft.com/office/powerpoint/2010/main" val="2286164954"/>
       </p:ext>
     </p:extLst>
   </p:cSld>

</xml_diff>